<commit_message>
Fixed typos and missing transitions.
</commit_message>
<xml_diff>
--- a/Presentation/World Builder VR Presentation.pptx
+++ b/Presentation/World Builder VR Presentation.pptx
@@ -303,7 +303,7 @@
           <a:p>
             <a:fld id="{4C7B6FA1-35C7-494D-BA17-8D9A6557A50F}" type="datetimeFigureOut">
               <a:rPr lang="cs-CZ" smtClean="0"/>
-              <a:t>14.12.2021</a:t>
+              <a:t>15.12.2021</a:t>
             </a:fld>
             <a:endParaRPr lang="cs-CZ"/>
           </a:p>
@@ -501,7 +501,7 @@
           <a:p>
             <a:fld id="{4C7B6FA1-35C7-494D-BA17-8D9A6557A50F}" type="datetimeFigureOut">
               <a:rPr lang="cs-CZ" smtClean="0"/>
-              <a:t>14.12.2021</a:t>
+              <a:t>15.12.2021</a:t>
             </a:fld>
             <a:endParaRPr lang="cs-CZ"/>
           </a:p>
@@ -709,7 +709,7 @@
           <a:p>
             <a:fld id="{4C7B6FA1-35C7-494D-BA17-8D9A6557A50F}" type="datetimeFigureOut">
               <a:rPr lang="cs-CZ" smtClean="0"/>
-              <a:t>14.12.2021</a:t>
+              <a:t>15.12.2021</a:t>
             </a:fld>
             <a:endParaRPr lang="cs-CZ"/>
           </a:p>
@@ -907,7 +907,7 @@
           <a:p>
             <a:fld id="{4C7B6FA1-35C7-494D-BA17-8D9A6557A50F}" type="datetimeFigureOut">
               <a:rPr lang="cs-CZ" smtClean="0"/>
-              <a:t>14.12.2021</a:t>
+              <a:t>15.12.2021</a:t>
             </a:fld>
             <a:endParaRPr lang="cs-CZ"/>
           </a:p>
@@ -1182,7 +1182,7 @@
           <a:p>
             <a:fld id="{4C7B6FA1-35C7-494D-BA17-8D9A6557A50F}" type="datetimeFigureOut">
               <a:rPr lang="cs-CZ" smtClean="0"/>
-              <a:t>14.12.2021</a:t>
+              <a:t>15.12.2021</a:t>
             </a:fld>
             <a:endParaRPr lang="cs-CZ"/>
           </a:p>
@@ -1447,7 +1447,7 @@
           <a:p>
             <a:fld id="{4C7B6FA1-35C7-494D-BA17-8D9A6557A50F}" type="datetimeFigureOut">
               <a:rPr lang="cs-CZ" smtClean="0"/>
-              <a:t>14.12.2021</a:t>
+              <a:t>15.12.2021</a:t>
             </a:fld>
             <a:endParaRPr lang="cs-CZ"/>
           </a:p>
@@ -1859,7 +1859,7 @@
           <a:p>
             <a:fld id="{4C7B6FA1-35C7-494D-BA17-8D9A6557A50F}" type="datetimeFigureOut">
               <a:rPr lang="cs-CZ" smtClean="0"/>
-              <a:t>14.12.2021</a:t>
+              <a:t>15.12.2021</a:t>
             </a:fld>
             <a:endParaRPr lang="cs-CZ"/>
           </a:p>
@@ -2000,7 +2000,7 @@
           <a:p>
             <a:fld id="{4C7B6FA1-35C7-494D-BA17-8D9A6557A50F}" type="datetimeFigureOut">
               <a:rPr lang="cs-CZ" smtClean="0"/>
-              <a:t>14.12.2021</a:t>
+              <a:t>15.12.2021</a:t>
             </a:fld>
             <a:endParaRPr lang="cs-CZ"/>
           </a:p>
@@ -2113,7 +2113,7 @@
           <a:p>
             <a:fld id="{4C7B6FA1-35C7-494D-BA17-8D9A6557A50F}" type="datetimeFigureOut">
               <a:rPr lang="cs-CZ" smtClean="0"/>
-              <a:t>14.12.2021</a:t>
+              <a:t>15.12.2021</a:t>
             </a:fld>
             <a:endParaRPr lang="cs-CZ"/>
           </a:p>
@@ -2424,7 +2424,7 @@
           <a:p>
             <a:fld id="{4C7B6FA1-35C7-494D-BA17-8D9A6557A50F}" type="datetimeFigureOut">
               <a:rPr lang="cs-CZ" smtClean="0"/>
-              <a:t>14.12.2021</a:t>
+              <a:t>15.12.2021</a:t>
             </a:fld>
             <a:endParaRPr lang="cs-CZ"/>
           </a:p>
@@ -2712,7 +2712,7 @@
           <a:p>
             <a:fld id="{4C7B6FA1-35C7-494D-BA17-8D9A6557A50F}" type="datetimeFigureOut">
               <a:rPr lang="cs-CZ" smtClean="0"/>
-              <a:t>14.12.2021</a:t>
+              <a:t>15.12.2021</a:t>
             </a:fld>
             <a:endParaRPr lang="cs-CZ"/>
           </a:p>
@@ -2953,7 +2953,7 @@
           <a:p>
             <a:fld id="{4C7B6FA1-35C7-494D-BA17-8D9A6557A50F}" type="datetimeFigureOut">
               <a:rPr lang="cs-CZ" smtClean="0"/>
-              <a:t>14.12.2021</a:t>
+              <a:t>15.12.2021</a:t>
             </a:fld>
             <a:endParaRPr lang="cs-CZ"/>
           </a:p>
@@ -4302,13 +4302,13 @@
   <p:clrMapOvr>
     <a:masterClrMapping/>
   </p:clrMapOvr>
-  <mc:AlternateContent xmlns:mc="http://schemas.openxmlformats.org/markup-compatibility/2006" xmlns:p14="http://schemas.microsoft.com/office/powerpoint/2010/main">
-    <mc:Choice Requires="p14">
+  <mc:AlternateContent xmlns:mc="http://schemas.openxmlformats.org/markup-compatibility/2006">
+    <mc:Choice xmlns:p14="http://schemas.microsoft.com/office/powerpoint/2010/main" Requires="p14">
       <p:transition p14:dur="250">
         <p:wipe/>
       </p:transition>
     </mc:Choice>
-    <mc:Fallback xmlns="">
+    <mc:Fallback>
       <p:transition>
         <p:wipe/>
       </p:transition>
@@ -6153,8 +6153,8 @@
         </p:nvSpPr>
         <p:spPr>
           <a:xfrm>
-            <a:off x="7677014" y="4355710"/>
-            <a:ext cx="2165209" cy="400110"/>
+            <a:off x="7718532" y="4355710"/>
+            <a:ext cx="2082172" cy="400110"/>
           </a:xfrm>
           <a:prstGeom prst="rect">
             <a:avLst/>
@@ -6182,23 +6182,8 @@
                 </a:solidFill>
                 <a:latin typeface="ITC Avant Garde Gothic LT Demi" pitchFamily="50" charset="0"/>
               </a:rPr>
-              <a:t>Open </a:t>
-            </a:r>
-            <a:r>
-              <a:rPr lang="cs-CZ" sz="2000" dirty="0" err="1">
-                <a:solidFill>
-                  <a:srgbClr val="9649AF"/>
-                </a:solidFill>
-                <a:latin typeface="ITC Avant Garde Gothic LT Demi" pitchFamily="50" charset="0"/>
-              </a:rPr>
-              <a:t>Starndard</a:t>
-            </a:r>
-            <a:endParaRPr lang="cs-CZ" sz="2000" dirty="0">
-              <a:solidFill>
-                <a:srgbClr val="9649AF"/>
-              </a:solidFill>
-              <a:latin typeface="ITC Avant Garde Gothic LT Demi" pitchFamily="50" charset="0"/>
-            </a:endParaRPr>
+              <a:t>Open Standard</a:t>
+            </a:r>
           </a:p>
         </p:txBody>
       </p:sp>
@@ -8185,8 +8170,8 @@
         </p:nvSpPr>
         <p:spPr>
           <a:xfrm>
-            <a:off x="983212" y="2645501"/>
-            <a:ext cx="4710520" cy="2308324"/>
+            <a:off x="897754" y="2368502"/>
+            <a:ext cx="4710520" cy="2862322"/>
           </a:xfrm>
           <a:prstGeom prst="rect">
             <a:avLst/>
@@ -8388,7 +8373,7 @@
               <a:buChar char="-"/>
             </a:pPr>
             <a:r>
-              <a:rPr lang="cs-CZ" dirty="0">
+              <a:rPr lang="cs-CZ" dirty="0" err="1">
                 <a:gradFill flip="none" rotWithShape="1">
                   <a:gsLst>
                     <a:gs pos="76000">
@@ -8412,7 +8397,88 @@
                 <a:latin typeface="Microsoft YaHei UI" panose="020B0503020204020204" pitchFamily="34" charset="-122"/>
                 <a:ea typeface="Microsoft YaHei UI" panose="020B0503020204020204" pitchFamily="34" charset="-122"/>
               </a:rPr>
-              <a:t>Editor Interaktivity</a:t>
+              <a:t>Stage</a:t>
+            </a:r>
+            <a:r>
+              <a:rPr lang="cs-CZ" dirty="0">
+                <a:gradFill flip="none" rotWithShape="1">
+                  <a:gsLst>
+                    <a:gs pos="76000">
+                      <a:schemeClr val="accent4"/>
+                    </a:gs>
+                    <a:gs pos="100000">
+                      <a:schemeClr val="accent4">
+                        <a:lumMod val="75000"/>
+                      </a:schemeClr>
+                    </a:gs>
+                    <a:gs pos="0">
+                      <a:schemeClr val="accent4">
+                        <a:lumMod val="40000"/>
+                        <a:lumOff val="60000"/>
+                      </a:schemeClr>
+                    </a:gs>
+                  </a:gsLst>
+                  <a:lin ang="5400000" scaled="1"/>
+                  <a:tileRect/>
+                </a:gradFill>
+                <a:latin typeface="Microsoft YaHei UI" panose="020B0503020204020204" pitchFamily="34" charset="-122"/>
+                <a:ea typeface="Microsoft YaHei UI" panose="020B0503020204020204" pitchFamily="34" charset="-122"/>
+              </a:rPr>
+              <a:t> </a:t>
+            </a:r>
+            <a:r>
+              <a:rPr lang="cs-CZ" dirty="0" err="1">
+                <a:gradFill flip="none" rotWithShape="1">
+                  <a:gsLst>
+                    <a:gs pos="76000">
+                      <a:schemeClr val="accent4"/>
+                    </a:gs>
+                    <a:gs pos="100000">
+                      <a:schemeClr val="accent4">
+                        <a:lumMod val="75000"/>
+                      </a:schemeClr>
+                    </a:gs>
+                    <a:gs pos="0">
+                      <a:schemeClr val="accent4">
+                        <a:lumMod val="40000"/>
+                        <a:lumOff val="60000"/>
+                      </a:schemeClr>
+                    </a:gs>
+                  </a:gsLst>
+                  <a:lin ang="5400000" scaled="1"/>
+                  <a:tileRect/>
+                </a:gradFill>
+                <a:latin typeface="Microsoft YaHei UI" panose="020B0503020204020204" pitchFamily="34" charset="-122"/>
+                <a:ea typeface="Microsoft YaHei UI" panose="020B0503020204020204" pitchFamily="34" charset="-122"/>
+              </a:rPr>
+              <a:t>Selection</a:t>
+            </a:r>
+            <a:r>
+              <a:rPr lang="cs-CZ" dirty="0">
+                <a:gradFill flip="none" rotWithShape="1">
+                  <a:gsLst>
+                    <a:gs pos="76000">
+                      <a:schemeClr val="accent4"/>
+                    </a:gs>
+                    <a:gs pos="100000">
+                      <a:schemeClr val="accent4">
+                        <a:lumMod val="75000"/>
+                      </a:schemeClr>
+                    </a:gs>
+                    <a:gs pos="0">
+                      <a:schemeClr val="accent4">
+                        <a:lumMod val="40000"/>
+                        <a:lumOff val="60000"/>
+                      </a:schemeClr>
+                    </a:gs>
+                  </a:gsLst>
+                  <a:lin ang="5400000" scaled="1"/>
+                  <a:tileRect/>
+                </a:gradFill>
+                <a:latin typeface="Microsoft YaHei UI" panose="020B0503020204020204" pitchFamily="34" charset="-122"/>
+                <a:ea typeface="Microsoft YaHei UI" panose="020B0503020204020204" pitchFamily="34" charset="-122"/>
+              </a:rPr>
+              <a:t> Menu</a:t>
             </a:r>
           </a:p>
           <a:p>
@@ -8475,7 +8541,7 @@
                 <a:latin typeface="Microsoft YaHei UI" panose="020B0503020204020204" pitchFamily="34" charset="-122"/>
                 <a:ea typeface="Microsoft YaHei UI" panose="020B0503020204020204" pitchFamily="34" charset="-122"/>
               </a:rPr>
-              <a:t>Klávesnice ve VR (přejmenování světů)</a:t>
+              <a:t>Editor Interaktivity</a:t>
             </a:r>
           </a:p>
           <a:p>
@@ -8508,6 +8574,69 @@
               <a:ea typeface="Microsoft YaHei UI" panose="020B0503020204020204" pitchFamily="34" charset="-122"/>
             </a:endParaRPr>
           </a:p>
+          <a:p>
+            <a:pPr marL="285750" indent="-285750">
+              <a:buFontTx/>
+              <a:buChar char="-"/>
+            </a:pPr>
+            <a:r>
+              <a:rPr lang="cs-CZ" dirty="0">
+                <a:gradFill flip="none" rotWithShape="1">
+                  <a:gsLst>
+                    <a:gs pos="76000">
+                      <a:schemeClr val="accent4"/>
+                    </a:gs>
+                    <a:gs pos="100000">
+                      <a:schemeClr val="accent4">
+                        <a:lumMod val="75000"/>
+                      </a:schemeClr>
+                    </a:gs>
+                    <a:gs pos="0">
+                      <a:schemeClr val="accent4">
+                        <a:lumMod val="40000"/>
+                        <a:lumOff val="60000"/>
+                      </a:schemeClr>
+                    </a:gs>
+                  </a:gsLst>
+                  <a:lin ang="5400000" scaled="1"/>
+                  <a:tileRect/>
+                </a:gradFill>
+                <a:latin typeface="Microsoft YaHei UI" panose="020B0503020204020204" pitchFamily="34" charset="-122"/>
+                <a:ea typeface="Microsoft YaHei UI" panose="020B0503020204020204" pitchFamily="34" charset="-122"/>
+              </a:rPr>
+              <a:t>Klávesnice ve VR (přejmenování světů)</a:t>
+            </a:r>
+          </a:p>
+          <a:p>
+            <a:pPr marL="285750" indent="-285750">
+              <a:buFontTx/>
+              <a:buChar char="-"/>
+            </a:pPr>
+            <a:endParaRPr lang="cs-CZ" dirty="0">
+              <a:gradFill flip="none" rotWithShape="1">
+                <a:gsLst>
+                  <a:gs pos="76000">
+                    <a:schemeClr val="accent4"/>
+                  </a:gs>
+                  <a:gs pos="100000">
+                    <a:schemeClr val="accent4">
+                      <a:lumMod val="75000"/>
+                    </a:schemeClr>
+                  </a:gs>
+                  <a:gs pos="0">
+                    <a:schemeClr val="accent4">
+                      <a:lumMod val="40000"/>
+                      <a:lumOff val="60000"/>
+                    </a:schemeClr>
+                  </a:gs>
+                </a:gsLst>
+                <a:lin ang="5400000" scaled="1"/>
+                <a:tileRect/>
+              </a:gradFill>
+              <a:latin typeface="Microsoft YaHei UI" panose="020B0503020204020204" pitchFamily="34" charset="-122"/>
+              <a:ea typeface="Microsoft YaHei UI" panose="020B0503020204020204" pitchFamily="34" charset="-122"/>
+            </a:endParaRPr>
+          </a:p>
         </p:txBody>
       </p:sp>
     </p:spTree>
@@ -8520,13 +8649,13 @@
   <p:clrMapOvr>
     <a:masterClrMapping/>
   </p:clrMapOvr>
-  <mc:AlternateContent xmlns:mc="http://schemas.openxmlformats.org/markup-compatibility/2006" xmlns:p14="http://schemas.microsoft.com/office/powerpoint/2010/main">
-    <mc:Choice Requires="p14">
+  <mc:AlternateContent xmlns:mc="http://schemas.openxmlformats.org/markup-compatibility/2006">
+    <mc:Choice xmlns:p14="http://schemas.microsoft.com/office/powerpoint/2010/main" Requires="p14">
       <p:transition p14:dur="250">
         <p:wipe/>
       </p:transition>
     </mc:Choice>
-    <mc:Fallback xmlns="">
+    <mc:Fallback>
       <p:transition>
         <p:wipe/>
       </p:transition>
@@ -8786,6 +8915,18 @@
   <p:clrMapOvr>
     <a:masterClrMapping/>
   </p:clrMapOvr>
+  <mc:AlternateContent xmlns:mc="http://schemas.openxmlformats.org/markup-compatibility/2006">
+    <mc:Choice xmlns:p14="http://schemas.microsoft.com/office/powerpoint/2010/main" Requires="p14">
+      <p:transition p14:dur="250">
+        <p:wipe/>
+      </p:transition>
+    </mc:Choice>
+    <mc:Fallback>
+      <p:transition>
+        <p:wipe/>
+      </p:transition>
+    </mc:Fallback>
+  </mc:AlternateContent>
 </p:sld>
 </file>
 
@@ -9158,6 +9299,18 @@
   <p:clrMapOvr>
     <a:masterClrMapping/>
   </p:clrMapOvr>
+  <mc:AlternateContent xmlns:mc="http://schemas.openxmlformats.org/markup-compatibility/2006">
+    <mc:Choice xmlns:p14="http://schemas.microsoft.com/office/powerpoint/2010/main" Requires="p14">
+      <p:transition p14:dur="250">
+        <p:wipe/>
+      </p:transition>
+    </mc:Choice>
+    <mc:Fallback>
+      <p:transition>
+        <p:wipe/>
+      </p:transition>
+    </mc:Fallback>
+  </mc:AlternateContent>
 </p:sld>
 </file>
 

</xml_diff>